<commit_message>
more litreview, proposal recast as unsupervised
</commit_message>
<xml_diff>
--- a/proposal/proposal.pptx
+++ b/proposal/proposal.pptx
@@ -5,12 +5,14 @@
     <p:sldMasterId id="2147483960" r:id="rId1"/>
   </p:sldMasterIdLst>
   <p:notesMasterIdLst>
-    <p:notesMasterId r:id="rId5"/>
+    <p:notesMasterId r:id="rId7"/>
   </p:notesMasterIdLst>
   <p:sldIdLst>
     <p:sldId id="256" r:id="rId2"/>
     <p:sldId id="257" r:id="rId3"/>
-    <p:sldId id="297" r:id="rId4"/>
+    <p:sldId id="299" r:id="rId4"/>
+    <p:sldId id="297" r:id="rId5"/>
+    <p:sldId id="298" r:id="rId6"/>
   </p:sldIdLst>
   <p:sldSz cx="9144000" cy="6858000" type="screen4x3"/>
   <p:notesSz cx="6858000" cy="9144000"/>
@@ -194,7 +196,7 @@
           <a:p>
             <a:fld id="{D5284F78-7885-4041-8899-3969C86202BC}" type="datetimeFigureOut">
               <a:rPr lang="en-US" smtClean="0"/>
-              <a:t>1/21/17</a:t>
+              <a:t>1/23/17</a:t>
             </a:fld>
             <a:endParaRPr lang="en-US"/>
           </a:p>
@@ -647,6 +649,208 @@
 </p:notes>
 </file>
 
+<file path=ppt/notesSlides/notesSlide3.xml><?xml version="1.0" encoding="utf-8"?>
+<p:notes xmlns:a="http://schemas.openxmlformats.org/drawingml/2006/main" xmlns:r="http://schemas.openxmlformats.org/officeDocument/2006/relationships" xmlns:p="http://schemas.openxmlformats.org/presentationml/2006/main">
+  <p:cSld>
+    <p:spTree>
+      <p:nvGrpSpPr>
+        <p:cNvPr id="1" name=""/>
+        <p:cNvGrpSpPr/>
+        <p:nvPr/>
+      </p:nvGrpSpPr>
+      <p:grpSpPr>
+        <a:xfrm>
+          <a:off x="0" y="0"/>
+          <a:ext cx="0" cy="0"/>
+          <a:chOff x="0" y="0"/>
+          <a:chExt cx="0" cy="0"/>
+        </a:xfrm>
+      </p:grpSpPr>
+      <p:sp>
+        <p:nvSpPr>
+          <p:cNvPr id="2" name="Slide Image Placeholder 1"/>
+          <p:cNvSpPr>
+            <a:spLocks noGrp="1" noRot="1" noChangeAspect="1"/>
+          </p:cNvSpPr>
+          <p:nvPr>
+            <p:ph type="sldImg"/>
+          </p:nvPr>
+        </p:nvSpPr>
+        <p:spPr/>
+      </p:sp>
+      <p:sp>
+        <p:nvSpPr>
+          <p:cNvPr id="3" name="Notes Placeholder 2"/>
+          <p:cNvSpPr>
+            <a:spLocks noGrp="1"/>
+          </p:cNvSpPr>
+          <p:nvPr>
+            <p:ph type="body" idx="1"/>
+          </p:nvPr>
+        </p:nvSpPr>
+        <p:spPr/>
+        <p:txBody>
+          <a:bodyPr/>
+          <a:lstStyle/>
+          <a:p>
+            <a:pPr marL="0" marR="0" lvl="1" indent="0" algn="l" defTabSz="457200" rtl="0" eaLnBrk="1" fontAlgn="auto" latinLnBrk="0" hangingPunct="1">
+              <a:lnSpc>
+                <a:spcPct val="100000"/>
+              </a:lnSpc>
+              <a:spcBef>
+                <a:spcPts val="0"/>
+              </a:spcBef>
+              <a:spcAft>
+                <a:spcPts val="0"/>
+              </a:spcAft>
+              <a:buClrTx/>
+              <a:buSzTx/>
+              <a:buFontTx/>
+              <a:buNone/>
+              <a:tabLst/>
+              <a:defRPr/>
+            </a:pPr>
+            <a:endParaRPr lang="en-US" dirty="0" smtClean="0"/>
+          </a:p>
+        </p:txBody>
+      </p:sp>
+      <p:sp>
+        <p:nvSpPr>
+          <p:cNvPr id="4" name="Slide Number Placeholder 3"/>
+          <p:cNvSpPr>
+            <a:spLocks noGrp="1"/>
+          </p:cNvSpPr>
+          <p:nvPr>
+            <p:ph type="sldNum" sz="quarter" idx="10"/>
+          </p:nvPr>
+        </p:nvSpPr>
+        <p:spPr/>
+        <p:txBody>
+          <a:bodyPr/>
+          <a:lstStyle/>
+          <a:p>
+            <a:fld id="{01C44D18-1D51-9E44-B2EF-5697FEB7B333}" type="slidenum">
+              <a:rPr lang="en-US" smtClean="0"/>
+              <a:t>4</a:t>
+            </a:fld>
+            <a:endParaRPr lang="en-US"/>
+          </a:p>
+        </p:txBody>
+      </p:sp>
+    </p:spTree>
+    <p:extLst>
+      <p:ext uri="{BB962C8B-B14F-4D97-AF65-F5344CB8AC3E}">
+        <p14:creationId xmlns:p14="http://schemas.microsoft.com/office/powerpoint/2010/main" val="4275482498"/>
+      </p:ext>
+    </p:extLst>
+  </p:cSld>
+  <p:clrMapOvr>
+    <a:masterClrMapping/>
+  </p:clrMapOvr>
+</p:notes>
+</file>
+
+<file path=ppt/notesSlides/notesSlide4.xml><?xml version="1.0" encoding="utf-8"?>
+<p:notes xmlns:a="http://schemas.openxmlformats.org/drawingml/2006/main" xmlns:r="http://schemas.openxmlformats.org/officeDocument/2006/relationships" xmlns:p="http://schemas.openxmlformats.org/presentationml/2006/main">
+  <p:cSld>
+    <p:spTree>
+      <p:nvGrpSpPr>
+        <p:cNvPr id="1" name=""/>
+        <p:cNvGrpSpPr/>
+        <p:nvPr/>
+      </p:nvGrpSpPr>
+      <p:grpSpPr>
+        <a:xfrm>
+          <a:off x="0" y="0"/>
+          <a:ext cx="0" cy="0"/>
+          <a:chOff x="0" y="0"/>
+          <a:chExt cx="0" cy="0"/>
+        </a:xfrm>
+      </p:grpSpPr>
+      <p:sp>
+        <p:nvSpPr>
+          <p:cNvPr id="2" name="Slide Image Placeholder 1"/>
+          <p:cNvSpPr>
+            <a:spLocks noGrp="1" noRot="1" noChangeAspect="1"/>
+          </p:cNvSpPr>
+          <p:nvPr>
+            <p:ph type="sldImg"/>
+          </p:nvPr>
+        </p:nvSpPr>
+        <p:spPr/>
+      </p:sp>
+      <p:sp>
+        <p:nvSpPr>
+          <p:cNvPr id="3" name="Notes Placeholder 2"/>
+          <p:cNvSpPr>
+            <a:spLocks noGrp="1"/>
+          </p:cNvSpPr>
+          <p:nvPr>
+            <p:ph type="body" idx="1"/>
+          </p:nvPr>
+        </p:nvSpPr>
+        <p:spPr/>
+        <p:txBody>
+          <a:bodyPr/>
+          <a:lstStyle/>
+          <a:p>
+            <a:pPr marL="0" marR="0" lvl="1" indent="0" algn="l" defTabSz="457200" rtl="0" eaLnBrk="1" fontAlgn="auto" latinLnBrk="0" hangingPunct="1">
+              <a:lnSpc>
+                <a:spcPct val="100000"/>
+              </a:lnSpc>
+              <a:spcBef>
+                <a:spcPts val="0"/>
+              </a:spcBef>
+              <a:spcAft>
+                <a:spcPts val="0"/>
+              </a:spcAft>
+              <a:buClrTx/>
+              <a:buSzTx/>
+              <a:buFontTx/>
+              <a:buNone/>
+              <a:tabLst/>
+              <a:defRPr/>
+            </a:pPr>
+            <a:endParaRPr lang="en-US" dirty="0" smtClean="0"/>
+          </a:p>
+        </p:txBody>
+      </p:sp>
+      <p:sp>
+        <p:nvSpPr>
+          <p:cNvPr id="4" name="Slide Number Placeholder 3"/>
+          <p:cNvSpPr>
+            <a:spLocks noGrp="1"/>
+          </p:cNvSpPr>
+          <p:nvPr>
+            <p:ph type="sldNum" sz="quarter" idx="10"/>
+          </p:nvPr>
+        </p:nvSpPr>
+        <p:spPr/>
+        <p:txBody>
+          <a:bodyPr/>
+          <a:lstStyle/>
+          <a:p>
+            <a:fld id="{01C44D18-1D51-9E44-B2EF-5697FEB7B333}" type="slidenum">
+              <a:rPr lang="en-US" smtClean="0"/>
+              <a:t>5</a:t>
+            </a:fld>
+            <a:endParaRPr lang="en-US"/>
+          </a:p>
+        </p:txBody>
+      </p:sp>
+    </p:spTree>
+    <p:extLst>
+      <p:ext uri="{BB962C8B-B14F-4D97-AF65-F5344CB8AC3E}">
+        <p14:creationId xmlns:p14="http://schemas.microsoft.com/office/powerpoint/2010/main" val="4275482498"/>
+      </p:ext>
+    </p:extLst>
+  </p:cSld>
+  <p:clrMapOvr>
+    <a:masterClrMapping/>
+  </p:clrMapOvr>
+</p:notes>
+</file>
+
 <file path=ppt/slideLayouts/slideLayout1.xml><?xml version="1.0" encoding="utf-8"?>
 <p:sldLayout xmlns:a="http://schemas.openxmlformats.org/drawingml/2006/main" xmlns:r="http://schemas.openxmlformats.org/officeDocument/2006/relationships" xmlns:p="http://schemas.openxmlformats.org/presentationml/2006/main" type="title" preserve="1">
   <p:cSld name="Title Slide">
@@ -835,7 +1039,7 @@
           <a:p>
             <a:fld id="{C8A432C8-69A7-458B-9684-2BFA64B31948}" type="datetime2">
               <a:rPr lang="en-US" smtClean="0"/>
-              <a:t>Saturday, January 21, 17</a:t>
+              <a:t>Monday, January 23, 17</a:t>
             </a:fld>
             <a:endParaRPr lang="en-US"/>
           </a:p>
@@ -1037,7 +1241,7 @@
           <a:p>
             <a:fld id="{8CC057FC-95B6-4D89-AFDA-ABA33EE921E5}" type="datetime2">
               <a:rPr lang="en-US" smtClean="0"/>
-              <a:t>Saturday, January 21, 17</a:t>
+              <a:t>Monday, January 23, 17</a:t>
             </a:fld>
             <a:endParaRPr lang="en-US"/>
           </a:p>
@@ -1214,7 +1418,7 @@
           <a:p>
             <a:fld id="{EC4549AC-EB31-477F-92A9-B1988E232878}" type="datetime2">
               <a:rPr lang="en-US" smtClean="0"/>
-              <a:t>Saturday, January 21, 17</a:t>
+              <a:t>Monday, January 23, 17</a:t>
             </a:fld>
             <a:endParaRPr lang="en-US"/>
           </a:p>
@@ -1381,7 +1585,7 @@
           <a:p>
             <a:fld id="{6396A3A3-94A6-4E5B-AF39-173ACA3E61CC}" type="datetime2">
               <a:rPr lang="en-US" smtClean="0"/>
-              <a:t>Saturday, January 21, 17</a:t>
+              <a:t>Monday, January 23, 17</a:t>
             </a:fld>
             <a:endParaRPr lang="en-US"/>
           </a:p>
@@ -1631,7 +1835,7 @@
           <a:p>
             <a:fld id="{9933D019-A32C-4EAD-B8E6-DBDA699692FD}" type="datetime2">
               <a:rPr lang="en-US" smtClean="0"/>
-              <a:t>Saturday, January 21, 17</a:t>
+              <a:t>Monday, January 23, 17</a:t>
             </a:fld>
             <a:endParaRPr lang="en-US"/>
           </a:p>
@@ -1951,7 +2155,7 @@
           <a:p>
             <a:fld id="{CCEBA98F-560C-4997-81C4-81D4D9187EAB}" type="datetime2">
               <a:rPr lang="en-US" smtClean="0"/>
-              <a:t>Saturday, January 21, 17</a:t>
+              <a:t>Monday, January 23, 17</a:t>
             </a:fld>
             <a:endParaRPr lang="en-US"/>
           </a:p>
@@ -2419,7 +2623,7 @@
           <a:p>
             <a:fld id="{150972B2-CA5C-437D-87D0-8081271A9E4B}" type="datetime2">
               <a:rPr lang="en-US" smtClean="0"/>
-              <a:t>Saturday, January 21, 17</a:t>
+              <a:t>Monday, January 23, 17</a:t>
             </a:fld>
             <a:endParaRPr lang="en-US"/>
           </a:p>
@@ -2569,7 +2773,7 @@
           <a:p>
             <a:fld id="{79CD4847-11EF-4466-A8AD-85CDB7B49118}" type="datetime2">
               <a:rPr lang="en-US" smtClean="0"/>
-              <a:t>Saturday, January 21, 17</a:t>
+              <a:t>Monday, January 23, 17</a:t>
             </a:fld>
             <a:endParaRPr lang="en-US"/>
           </a:p>
@@ -2661,7 +2865,7 @@
           <a:p>
             <a:fld id="{F168457A-3AB9-4880-8A0C-9F8524491207}" type="datetime2">
               <a:rPr lang="en-US" smtClean="0"/>
-              <a:t>Saturday, January 21, 17</a:t>
+              <a:t>Monday, January 23, 17</a:t>
             </a:fld>
             <a:endParaRPr lang="en-US"/>
           </a:p>
@@ -2937,7 +3141,7 @@
           <a:p>
             <a:fld id="{3FE976D3-5B7F-4300-ABED-C91F1B2AE209}" type="datetime2">
               <a:rPr lang="en-US" smtClean="0"/>
-              <a:t>Saturday, January 21, 17</a:t>
+              <a:t>Monday, January 23, 17</a:t>
             </a:fld>
             <a:endParaRPr lang="en-US"/>
           </a:p>
@@ -3244,7 +3448,7 @@
           <a:p>
             <a:fld id="{EBDC1E59-17DD-41CE-97CA-624A472382D4}" type="datetime2">
               <a:rPr lang="en-US" smtClean="0"/>
-              <a:t>Saturday, January 21, 17</a:t>
+              <a:t>Monday, January 23, 17</a:t>
             </a:fld>
             <a:endParaRPr lang="en-US"/>
           </a:p>
@@ -3544,7 +3748,7 @@
           <a:p>
             <a:fld id="{A80CB818-7379-467D-8E76-EF9D9074A26C}" type="datetime2">
               <a:rPr lang="en-US" smtClean="0"/>
-              <a:t>Saturday, January 21, 17</a:t>
+              <a:t>Monday, January 23, 17</a:t>
             </a:fld>
             <a:endParaRPr lang="en-US" dirty="0"/>
           </a:p>
@@ -3964,21 +4168,14 @@
                 <a:latin typeface="Arial"/>
                 <a:cs typeface="Arial"/>
               </a:rPr>
-              <a:t>Blind </a:t>
-            </a:r>
-            <a:r>
-              <a:rPr lang="en-US" cap="none" dirty="0" err="1" smtClean="0">
-                <a:latin typeface="Arial"/>
-                <a:cs typeface="Arial"/>
-              </a:rPr>
-              <a:t>Inharmonicity</a:t>
+              <a:t>Unsupervised Guitar Tab </a:t>
             </a:r>
             <a:r>
               <a:rPr lang="en-US" cap="none" dirty="0" smtClean="0">
                 <a:latin typeface="Arial"/>
                 <a:cs typeface="Arial"/>
               </a:rPr>
-              <a:t>-Based Auto Tab Generation</a:t>
+              <a:t>Generation</a:t>
             </a:r>
             <a:endParaRPr lang="en-US" cap="none" dirty="0">
               <a:latin typeface="Arial"/>
@@ -4014,13 +4211,8 @@
           <a:p>
             <a:r>
               <a:rPr lang="en-US" dirty="0" smtClean="0"/>
-              <a:t>Music &amp; Tech s</a:t>
-            </a:r>
-            <a:r>
-              <a:rPr lang="en-US" dirty="0" smtClean="0"/>
-              <a:t>eminar MM/DD/YY</a:t>
-            </a:r>
-            <a:endParaRPr lang="en-US" dirty="0" smtClean="0"/>
+              <a:t>Music &amp; Tech seminar MM/DD/YY</a:t>
+            </a:r>
           </a:p>
           <a:p>
             <a:r>
@@ -4110,7 +4302,6 @@
               <a:rPr lang="en-US" dirty="0" smtClean="0"/>
               <a:t>Problem Description &amp; Motivation</a:t>
             </a:r>
-            <a:endParaRPr lang="en-US" dirty="0" smtClean="0"/>
           </a:p>
           <a:p>
             <a:r>
@@ -4124,21 +4315,18 @@
               <a:rPr lang="en-US" dirty="0" smtClean="0"/>
               <a:t>My Idea</a:t>
             </a:r>
-            <a:endParaRPr lang="en-US" dirty="0" smtClean="0"/>
           </a:p>
           <a:p>
             <a:r>
               <a:rPr lang="en-US" dirty="0" smtClean="0"/>
               <a:t>Experiments I’ll conduct, what I think they’ll show</a:t>
             </a:r>
-            <a:endParaRPr lang="en-US" dirty="0" smtClean="0"/>
           </a:p>
           <a:p>
             <a:r>
               <a:rPr lang="en-US" dirty="0" smtClean="0"/>
               <a:t>Evaluation/completion measures</a:t>
             </a:r>
-            <a:endParaRPr lang="en-US" dirty="0" smtClean="0"/>
           </a:p>
         </p:txBody>
       </p:sp>
@@ -4197,7 +4385,221 @@
             <a:pPr lvl="1"/>
             <a:r>
               <a:rPr lang="en-US" dirty="0" smtClean="0"/>
-              <a:t>Physical</a:t>
+              <a:t>Effects/processing</a:t>
+            </a:r>
+          </a:p>
+          <a:p>
+            <a:pPr lvl="2"/>
+            <a:r>
+              <a:rPr lang="en-US" dirty="0" smtClean="0"/>
+              <a:t>Stein 2010</a:t>
+            </a:r>
+          </a:p>
+          <a:p>
+            <a:pPr lvl="1"/>
+            <a:r>
+              <a:rPr lang="en-US" dirty="0" err="1" smtClean="0"/>
+              <a:t>Inharmonicity</a:t>
+            </a:r>
+            <a:endParaRPr lang="en-US" dirty="0" smtClean="0"/>
+          </a:p>
+          <a:p>
+            <a:pPr lvl="2"/>
+            <a:r>
+              <a:rPr lang="en-US" dirty="0" err="1" smtClean="0"/>
+              <a:t>Barbancho</a:t>
+            </a:r>
+            <a:r>
+              <a:rPr lang="en-US" dirty="0"/>
+              <a:t> </a:t>
+            </a:r>
+            <a:r>
+              <a:rPr lang="en-US" dirty="0" smtClean="0"/>
+              <a:t>2008, </a:t>
+            </a:r>
+            <a:r>
+              <a:rPr lang="en-US" dirty="0" err="1" smtClean="0"/>
+              <a:t>Rauhala</a:t>
+            </a:r>
+            <a:r>
+              <a:rPr lang="en-US" dirty="0" smtClean="0"/>
+              <a:t> 2007</a:t>
+            </a:r>
+          </a:p>
+          <a:p>
+            <a:pPr lvl="1"/>
+            <a:r>
+              <a:rPr lang="en-US" dirty="0" smtClean="0"/>
+              <a:t>NT spectrum</a:t>
+            </a:r>
+          </a:p>
+          <a:p>
+            <a:pPr lvl="2"/>
+            <a:r>
+              <a:rPr lang="en-US" dirty="0" err="1" smtClean="0"/>
+              <a:t>Fragoulis</a:t>
+            </a:r>
+            <a:r>
+              <a:rPr lang="en-US" dirty="0" smtClean="0"/>
+              <a:t> 2006,</a:t>
+            </a:r>
+          </a:p>
+          <a:p>
+            <a:pPr lvl="1"/>
+            <a:r>
+              <a:rPr lang="en-US" dirty="0" smtClean="0"/>
+              <a:t>Playing style</a:t>
+            </a:r>
+          </a:p>
+          <a:p>
+            <a:pPr lvl="2"/>
+            <a:r>
+              <a:rPr lang="en-US" dirty="0" err="1" smtClean="0"/>
+              <a:t>Abesser</a:t>
+            </a:r>
+            <a:r>
+              <a:rPr lang="en-US" dirty="0" smtClean="0"/>
+              <a:t> 2010</a:t>
+            </a:r>
+          </a:p>
+          <a:p>
+            <a:pPr lvl="1"/>
+            <a:r>
+              <a:rPr lang="en-US" dirty="0" smtClean="0"/>
+              <a:t>Plucking point</a:t>
+            </a:r>
+          </a:p>
+          <a:p>
+            <a:pPr lvl="2"/>
+            <a:r>
+              <a:rPr lang="en-US" dirty="0" err="1" smtClean="0"/>
+              <a:t>Abesser</a:t>
+            </a:r>
+            <a:r>
+              <a:rPr lang="en-US" dirty="0" smtClean="0"/>
+              <a:t> 2010, </a:t>
+            </a:r>
+            <a:r>
+              <a:rPr lang="en-US" dirty="0" err="1" smtClean="0"/>
+              <a:t>Traube</a:t>
+            </a:r>
+            <a:r>
+              <a:rPr lang="en-US" dirty="0" smtClean="0"/>
+              <a:t> 2004, </a:t>
+            </a:r>
+            <a:r>
+              <a:rPr lang="en-US" dirty="0" err="1" smtClean="0"/>
+              <a:t>Penttinen</a:t>
+            </a:r>
+            <a:r>
+              <a:rPr lang="en-US" dirty="0" smtClean="0"/>
+              <a:t> 2005</a:t>
+            </a:r>
+            <a:endParaRPr lang="en-US" dirty="0"/>
+          </a:p>
+        </p:txBody>
+      </p:sp>
+      <p:sp>
+        <p:nvSpPr>
+          <p:cNvPr id="4" name="Title 3"/>
+          <p:cNvSpPr>
+            <a:spLocks noGrp="1"/>
+          </p:cNvSpPr>
+          <p:nvPr>
+            <p:ph type="title"/>
+          </p:nvPr>
+        </p:nvSpPr>
+        <p:spPr/>
+        <p:txBody>
+          <a:bodyPr>
+            <a:normAutofit/>
+          </a:bodyPr>
+          <a:lstStyle/>
+          <a:p>
+            <a:r>
+              <a:rPr lang="en-US" dirty="0" smtClean="0"/>
+              <a:t>Existing work: guitar </a:t>
+            </a:r>
+            <a:r>
+              <a:rPr lang="en-US" dirty="0" err="1" smtClean="0"/>
+              <a:t>param</a:t>
+            </a:r>
+            <a:r>
+              <a:rPr lang="en-US" dirty="0"/>
+              <a:t> </a:t>
+            </a:r>
+            <a:r>
+              <a:rPr lang="en-US" dirty="0" smtClean="0"/>
+              <a:t>extraction</a:t>
+            </a:r>
+            <a:endParaRPr lang="en-US" i="1" dirty="0"/>
+          </a:p>
+        </p:txBody>
+      </p:sp>
+    </p:spTree>
+    <p:extLst>
+      <p:ext uri="{BB962C8B-B14F-4D97-AF65-F5344CB8AC3E}">
+        <p14:creationId xmlns:p14="http://schemas.microsoft.com/office/powerpoint/2010/main" val="4289465049"/>
+      </p:ext>
+    </p:extLst>
+  </p:cSld>
+  <p:clrMapOvr>
+    <a:masterClrMapping/>
+  </p:clrMapOvr>
+  <p:timing>
+    <p:tnLst>
+      <p:par>
+        <p:cTn xmlns:p14="http://schemas.microsoft.com/office/powerpoint/2010/main" id="1" dur="indefinite" restart="never" nodeType="tmRoot"/>
+      </p:par>
+    </p:tnLst>
+  </p:timing>
+</p:sld>
+</file>
+
+<file path=ppt/slides/slide4.xml><?xml version="1.0" encoding="utf-8"?>
+<p:sld xmlns:a="http://schemas.openxmlformats.org/drawingml/2006/main" xmlns:r="http://schemas.openxmlformats.org/officeDocument/2006/relationships" xmlns:p="http://schemas.openxmlformats.org/presentationml/2006/main">
+  <p:cSld>
+    <p:spTree>
+      <p:nvGrpSpPr>
+        <p:cNvPr id="1" name=""/>
+        <p:cNvGrpSpPr/>
+        <p:nvPr/>
+      </p:nvGrpSpPr>
+      <p:grpSpPr>
+        <a:xfrm>
+          <a:off x="0" y="0"/>
+          <a:ext cx="0" cy="0"/>
+          <a:chOff x="0" y="0"/>
+          <a:chExt cx="0" cy="0"/>
+        </a:xfrm>
+      </p:grpSpPr>
+      <p:sp>
+        <p:nvSpPr>
+          <p:cNvPr id="3" name="Content Placeholder 2"/>
+          <p:cNvSpPr>
+            <a:spLocks noGrp="1"/>
+          </p:cNvSpPr>
+          <p:nvPr>
+            <p:ph idx="1"/>
+          </p:nvPr>
+        </p:nvSpPr>
+        <p:spPr/>
+        <p:txBody>
+          <a:bodyPr/>
+          <a:lstStyle/>
+          <a:p>
+            <a:pPr lvl="1"/>
+            <a:r>
+              <a:rPr lang="en-US" dirty="0"/>
+              <a:t>V</a:t>
+            </a:r>
+            <a:r>
+              <a:rPr lang="en-US" dirty="0" smtClean="0"/>
+              <a:t>alid and high-quality tabs</a:t>
+            </a:r>
+            <a:r>
+              <a:rPr lang="en-US" dirty="0" smtClean="0"/>
+              <a:t>, though not necessarily exact!</a:t>
             </a:r>
           </a:p>
           <a:p>
@@ -4208,11 +4610,50 @@
             </a:r>
           </a:p>
           <a:p>
-            <a:pPr lvl="1"/>
+            <a:pPr lvl="2"/>
             <a:r>
               <a:rPr lang="en-US" dirty="0" smtClean="0"/>
-              <a:t>Video</a:t>
-            </a:r>
+              <a:t>Gagnon – NN, hand positions</a:t>
+            </a:r>
+          </a:p>
+          <a:p>
+            <a:pPr lvl="2"/>
+            <a:r>
+              <a:rPr lang="en-US" dirty="0" err="1" smtClean="0"/>
+              <a:t>Radicioni</a:t>
+            </a:r>
+            <a:r>
+              <a:rPr lang="en-US" dirty="0" smtClean="0"/>
+              <a:t> 2005 – graph search</a:t>
+            </a:r>
+          </a:p>
+          <a:p>
+            <a:pPr lvl="2"/>
+            <a:r>
+              <a:rPr lang="en-US" dirty="0" err="1"/>
+              <a:t>R</a:t>
+            </a:r>
+            <a:r>
+              <a:rPr lang="en-US" dirty="0" err="1" smtClean="0"/>
+              <a:t>adisavljevic</a:t>
+            </a:r>
+            <a:r>
+              <a:rPr lang="en-US" dirty="0" smtClean="0"/>
+              <a:t> 2004 – path difference  learning</a:t>
+            </a:r>
+            <a:endParaRPr lang="en-US" dirty="0" smtClean="0"/>
+          </a:p>
+          <a:p>
+            <a:pPr lvl="2"/>
+            <a:r>
+              <a:rPr lang="en-US" dirty="0" err="1" smtClean="0"/>
+              <a:t>Tuohy</a:t>
+            </a:r>
+            <a:r>
+              <a:rPr lang="en-US" dirty="0" smtClean="0"/>
+              <a:t> – GA, NN </a:t>
+            </a:r>
+            <a:endParaRPr lang="en-US" dirty="0" smtClean="0"/>
           </a:p>
           <a:p>
             <a:pPr lvl="1"/>
@@ -4225,45 +4666,45 @@
             <a:pPr lvl="2"/>
             <a:r>
               <a:rPr lang="en-US" dirty="0" err="1" smtClean="0"/>
-              <a:t>Inharmonicity</a:t>
+              <a:t>Yazawa</a:t>
             </a:r>
             <a:r>
               <a:rPr lang="en-US" dirty="0" smtClean="0"/>
-              <a:t>-based</a:t>
-            </a:r>
-          </a:p>
-          <a:p>
-            <a:pPr lvl="2"/>
+              <a:t> </a:t>
+            </a:r>
+            <a:r>
+              <a:rPr lang="en-US" dirty="0"/>
+              <a:t>– LHA, filtering</a:t>
+            </a:r>
+          </a:p>
+        </p:txBody>
+      </p:sp>
+      <p:sp>
+        <p:nvSpPr>
+          <p:cNvPr id="4" name="Title 3"/>
+          <p:cNvSpPr>
+            <a:spLocks noGrp="1"/>
+          </p:cNvSpPr>
+          <p:nvPr>
+            <p:ph type="title"/>
+          </p:nvPr>
+        </p:nvSpPr>
+        <p:spPr/>
+        <p:txBody>
+          <a:bodyPr>
+            <a:normAutofit/>
+          </a:bodyPr>
+          <a:lstStyle/>
+          <a:p>
             <a:r>
               <a:rPr lang="en-US" dirty="0" smtClean="0"/>
-              <a:t>Multi-feature learning/classification</a:t>
-            </a:r>
-            <a:endParaRPr lang="en-US" dirty="0" smtClean="0"/>
-          </a:p>
-        </p:txBody>
-      </p:sp>
-      <p:sp>
-        <p:nvSpPr>
-          <p:cNvPr id="4" name="Title 3"/>
-          <p:cNvSpPr>
-            <a:spLocks noGrp="1"/>
-          </p:cNvSpPr>
-          <p:nvPr>
-            <p:ph type="title"/>
-          </p:nvPr>
-        </p:nvSpPr>
-        <p:spPr/>
-        <p:txBody>
-          <a:bodyPr>
-            <a:normAutofit fontScale="90000"/>
-          </a:bodyPr>
-          <a:lstStyle/>
-          <a:p>
-            <a:r>
-              <a:rPr lang="en-US" dirty="0" smtClean="0"/>
-              <a:t>Literature: string-fret determination methods</a:t>
-            </a:r>
-            <a:endParaRPr lang="en-US" dirty="0"/>
+              <a:t>Existing work: tablature </a:t>
+            </a:r>
+            <a:r>
+              <a:rPr lang="en-US" i="1" dirty="0" smtClean="0"/>
+              <a:t>generation</a:t>
+            </a:r>
+            <a:endParaRPr lang="en-US" i="1" dirty="0"/>
           </a:p>
         </p:txBody>
       </p:sp>
@@ -4271,6 +4712,198 @@
     <p:extLst>
       <p:ext uri="{BB962C8B-B14F-4D97-AF65-F5344CB8AC3E}">
         <p14:creationId xmlns:p14="http://schemas.microsoft.com/office/powerpoint/2010/main" val="2541987530"/>
+      </p:ext>
+    </p:extLst>
+  </p:cSld>
+  <p:clrMapOvr>
+    <a:masterClrMapping/>
+  </p:clrMapOvr>
+  <p:timing>
+    <p:tnLst>
+      <p:par>
+        <p:cTn xmlns:p14="http://schemas.microsoft.com/office/powerpoint/2010/main" id="1" dur="indefinite" restart="never" nodeType="tmRoot"/>
+      </p:par>
+    </p:tnLst>
+  </p:timing>
+</p:sld>
+</file>
+
+<file path=ppt/slides/slide5.xml><?xml version="1.0" encoding="utf-8"?>
+<p:sld xmlns:a="http://schemas.openxmlformats.org/drawingml/2006/main" xmlns:r="http://schemas.openxmlformats.org/officeDocument/2006/relationships" xmlns:p="http://schemas.openxmlformats.org/presentationml/2006/main">
+  <p:cSld>
+    <p:spTree>
+      <p:nvGrpSpPr>
+        <p:cNvPr id="1" name=""/>
+        <p:cNvGrpSpPr/>
+        <p:nvPr/>
+      </p:nvGrpSpPr>
+      <p:grpSpPr>
+        <a:xfrm>
+          <a:off x="0" y="0"/>
+          <a:ext cx="0" cy="0"/>
+          <a:chOff x="0" y="0"/>
+          <a:chExt cx="0" cy="0"/>
+        </a:xfrm>
+      </p:grpSpPr>
+      <p:sp>
+        <p:nvSpPr>
+          <p:cNvPr id="3" name="Content Placeholder 2"/>
+          <p:cNvSpPr>
+            <a:spLocks noGrp="1"/>
+          </p:cNvSpPr>
+          <p:nvPr>
+            <p:ph idx="1"/>
+          </p:nvPr>
+        </p:nvSpPr>
+        <p:spPr/>
+        <p:txBody>
+          <a:bodyPr/>
+          <a:lstStyle/>
+          <a:p>
+            <a:pPr lvl="1"/>
+            <a:r>
+              <a:rPr lang="en-US" dirty="0"/>
+              <a:t>E</a:t>
+            </a:r>
+            <a:r>
+              <a:rPr lang="en-US" dirty="0" smtClean="0"/>
+              <a:t>xact string-fret combo! Sometimes, various constraints.</a:t>
+            </a:r>
+          </a:p>
+          <a:p>
+            <a:pPr lvl="1"/>
+            <a:r>
+              <a:rPr lang="en-US" dirty="0" smtClean="0"/>
+              <a:t>Physical</a:t>
+            </a:r>
+          </a:p>
+          <a:p>
+            <a:pPr lvl="2"/>
+            <a:r>
+              <a:rPr lang="en-US" dirty="0" smtClean="0"/>
+              <a:t>O’Grady 2009</a:t>
+            </a:r>
+            <a:endParaRPr lang="en-US" dirty="0" smtClean="0"/>
+          </a:p>
+          <a:p>
+            <a:pPr lvl="1"/>
+            <a:r>
+              <a:rPr lang="en-US" dirty="0" smtClean="0"/>
+              <a:t>Video</a:t>
+            </a:r>
+          </a:p>
+          <a:p>
+            <a:pPr lvl="2"/>
+            <a:r>
+              <a:rPr lang="en-US" dirty="0" err="1" smtClean="0"/>
+              <a:t>Paleari</a:t>
+            </a:r>
+            <a:r>
+              <a:rPr lang="en-US" dirty="0" smtClean="0"/>
+              <a:t> 2008, </a:t>
+            </a:r>
+            <a:r>
+              <a:rPr lang="en-US" dirty="0" err="1" smtClean="0"/>
+              <a:t>Kerdvibulvech</a:t>
+            </a:r>
+            <a:r>
+              <a:rPr lang="en-US" dirty="0" smtClean="0"/>
+              <a:t> 2007, Burns 2006</a:t>
+            </a:r>
+            <a:endParaRPr lang="en-US" dirty="0" smtClean="0"/>
+          </a:p>
+          <a:p>
+            <a:pPr lvl="1"/>
+            <a:r>
+              <a:rPr lang="en-US" dirty="0" smtClean="0"/>
+              <a:t>Audio</a:t>
+            </a:r>
+          </a:p>
+          <a:p>
+            <a:pPr lvl="2"/>
+            <a:r>
+              <a:rPr lang="en-US" dirty="0" err="1" smtClean="0"/>
+              <a:t>Barbancho</a:t>
+            </a:r>
+            <a:r>
+              <a:rPr lang="en-US" dirty="0" smtClean="0"/>
+              <a:t> 2012, 2012, 2009</a:t>
+            </a:r>
+            <a:endParaRPr lang="en-US" dirty="0" smtClean="0"/>
+          </a:p>
+          <a:p>
+            <a:pPr lvl="2"/>
+            <a:r>
+              <a:rPr lang="en-US" dirty="0" err="1" smtClean="0"/>
+              <a:t>Kehling</a:t>
+            </a:r>
+            <a:r>
+              <a:rPr lang="en-US" dirty="0" smtClean="0"/>
+              <a:t> 2014, </a:t>
+            </a:r>
+            <a:r>
+              <a:rPr lang="en-US" dirty="0" err="1" smtClean="0"/>
+              <a:t>Abesser</a:t>
+            </a:r>
+            <a:r>
+              <a:rPr lang="en-US" dirty="0" smtClean="0"/>
+              <a:t> 2013,</a:t>
+            </a:r>
+            <a:r>
+              <a:rPr lang="en-US" dirty="0" smtClean="0"/>
+              <a:t> </a:t>
+            </a:r>
+            <a:r>
+              <a:rPr lang="en-US" dirty="0" err="1" smtClean="0"/>
+              <a:t>Dittmar</a:t>
+            </a:r>
+            <a:r>
+              <a:rPr lang="en-US" dirty="0" smtClean="0"/>
+              <a:t> 2012</a:t>
+            </a:r>
+          </a:p>
+          <a:p>
+            <a:pPr lvl="2"/>
+            <a:r>
+              <a:rPr lang="en-US" dirty="0" smtClean="0"/>
+              <a:t>A priori / training knowledge required</a:t>
+            </a:r>
+          </a:p>
+        </p:txBody>
+      </p:sp>
+      <p:sp>
+        <p:nvSpPr>
+          <p:cNvPr id="4" name="Title 3"/>
+          <p:cNvSpPr>
+            <a:spLocks noGrp="1"/>
+          </p:cNvSpPr>
+          <p:nvPr>
+            <p:ph type="title"/>
+          </p:nvPr>
+        </p:nvSpPr>
+        <p:spPr/>
+        <p:txBody>
+          <a:bodyPr>
+            <a:normAutofit/>
+          </a:bodyPr>
+          <a:lstStyle/>
+          <a:p>
+            <a:r>
+              <a:rPr lang="en-US" dirty="0" smtClean="0"/>
+              <a:t>Existing work: tablature </a:t>
+            </a:r>
+            <a:r>
+              <a:rPr lang="en-US" i="1" dirty="0" smtClean="0"/>
+              <a:t>transcription</a:t>
+            </a:r>
+            <a:endParaRPr lang="en-US" i="1" dirty="0"/>
+          </a:p>
+        </p:txBody>
+      </p:sp>
+    </p:spTree>
+    <p:extLst>
+      <p:ext uri="{BB962C8B-B14F-4D97-AF65-F5344CB8AC3E}">
+        <p14:creationId xmlns:p14="http://schemas.microsoft.com/office/powerpoint/2010/main" val="3711054321"/>
       </p:ext>
     </p:extLst>
   </p:cSld>

</xml_diff>

<commit_message>
recent work (>2013) litreview, SF alterations
</commit_message>
<xml_diff>
--- a/proposal/proposal.pptx
+++ b/proposal/proposal.pptx
@@ -5,7 +5,7 @@
     <p:sldMasterId id="2147483960" r:id="rId1"/>
   </p:sldMasterIdLst>
   <p:notesMasterIdLst>
-    <p:notesMasterId r:id="rId7"/>
+    <p:notesMasterId r:id="rId8"/>
   </p:notesMasterIdLst>
   <p:sldIdLst>
     <p:sldId id="256" r:id="rId2"/>
@@ -13,6 +13,7 @@
     <p:sldId id="299" r:id="rId4"/>
     <p:sldId id="297" r:id="rId5"/>
     <p:sldId id="298" r:id="rId6"/>
+    <p:sldId id="300" r:id="rId7"/>
   </p:sldIdLst>
   <p:sldSz cx="9144000" cy="6858000" type="screen4x3"/>
   <p:notesSz cx="6858000" cy="9144000"/>
@@ -196,7 +197,7 @@
           <a:p>
             <a:fld id="{D5284F78-7885-4041-8899-3969C86202BC}" type="datetimeFigureOut">
               <a:rPr lang="en-US" smtClean="0"/>
-              <a:t>1/23/17</a:t>
+              <a:t>1/25/17</a:t>
             </a:fld>
             <a:endParaRPr lang="en-US"/>
           </a:p>
@@ -811,6 +812,22 @@
               <a:tabLst/>
               <a:defRPr/>
             </a:pPr>
+            <a:r>
+              <a:rPr lang="en-US" dirty="0" err="1" smtClean="0"/>
+              <a:t>Burlet</a:t>
+            </a:r>
+            <a:r>
+              <a:rPr lang="en-US" dirty="0" smtClean="0"/>
+              <a:t>, </a:t>
+            </a:r>
+            <a:r>
+              <a:rPr lang="en-US" dirty="0" err="1" smtClean="0"/>
+              <a:t>cohen</a:t>
+            </a:r>
+            <a:r>
+              <a:rPr lang="en-US" dirty="0" smtClean="0"/>
+              <a:t>?</a:t>
+            </a:r>
             <a:endParaRPr lang="en-US" dirty="0" smtClean="0"/>
           </a:p>
         </p:txBody>
@@ -833,6 +850,123 @@
             <a:fld id="{01C44D18-1D51-9E44-B2EF-5697FEB7B333}" type="slidenum">
               <a:rPr lang="en-US" smtClean="0"/>
               <a:t>5</a:t>
+            </a:fld>
+            <a:endParaRPr lang="en-US"/>
+          </a:p>
+        </p:txBody>
+      </p:sp>
+    </p:spTree>
+    <p:extLst>
+      <p:ext uri="{BB962C8B-B14F-4D97-AF65-F5344CB8AC3E}">
+        <p14:creationId xmlns:p14="http://schemas.microsoft.com/office/powerpoint/2010/main" val="4275482498"/>
+      </p:ext>
+    </p:extLst>
+  </p:cSld>
+  <p:clrMapOvr>
+    <a:masterClrMapping/>
+  </p:clrMapOvr>
+</p:notes>
+</file>
+
+<file path=ppt/notesSlides/notesSlide5.xml><?xml version="1.0" encoding="utf-8"?>
+<p:notes xmlns:a="http://schemas.openxmlformats.org/drawingml/2006/main" xmlns:r="http://schemas.openxmlformats.org/officeDocument/2006/relationships" xmlns:p="http://schemas.openxmlformats.org/presentationml/2006/main">
+  <p:cSld>
+    <p:spTree>
+      <p:nvGrpSpPr>
+        <p:cNvPr id="1" name=""/>
+        <p:cNvGrpSpPr/>
+        <p:nvPr/>
+      </p:nvGrpSpPr>
+      <p:grpSpPr>
+        <a:xfrm>
+          <a:off x="0" y="0"/>
+          <a:ext cx="0" cy="0"/>
+          <a:chOff x="0" y="0"/>
+          <a:chExt cx="0" cy="0"/>
+        </a:xfrm>
+      </p:grpSpPr>
+      <p:sp>
+        <p:nvSpPr>
+          <p:cNvPr id="2" name="Slide Image Placeholder 1"/>
+          <p:cNvSpPr>
+            <a:spLocks noGrp="1" noRot="1" noChangeAspect="1"/>
+          </p:cNvSpPr>
+          <p:nvPr>
+            <p:ph type="sldImg"/>
+          </p:nvPr>
+        </p:nvSpPr>
+        <p:spPr/>
+      </p:sp>
+      <p:sp>
+        <p:nvSpPr>
+          <p:cNvPr id="3" name="Notes Placeholder 2"/>
+          <p:cNvSpPr>
+            <a:spLocks noGrp="1"/>
+          </p:cNvSpPr>
+          <p:nvPr>
+            <p:ph type="body" idx="1"/>
+          </p:nvPr>
+        </p:nvSpPr>
+        <p:spPr/>
+        <p:txBody>
+          <a:bodyPr/>
+          <a:lstStyle/>
+          <a:p>
+            <a:pPr marL="0" marR="0" lvl="1" indent="0" algn="l" defTabSz="457200" rtl="0" eaLnBrk="1" fontAlgn="auto" latinLnBrk="0" hangingPunct="1">
+              <a:lnSpc>
+                <a:spcPct val="100000"/>
+              </a:lnSpc>
+              <a:spcBef>
+                <a:spcPts val="0"/>
+              </a:spcBef>
+              <a:spcAft>
+                <a:spcPts val="0"/>
+              </a:spcAft>
+              <a:buClrTx/>
+              <a:buSzTx/>
+              <a:buFontTx/>
+              <a:buNone/>
+              <a:tabLst/>
+              <a:defRPr/>
+            </a:pPr>
+            <a:r>
+              <a:rPr lang="en-US" dirty="0" err="1" smtClean="0"/>
+              <a:t>Burlet</a:t>
+            </a:r>
+            <a:r>
+              <a:rPr lang="en-US" dirty="0" smtClean="0"/>
+              <a:t>, </a:t>
+            </a:r>
+            <a:r>
+              <a:rPr lang="en-US" dirty="0" err="1" smtClean="0"/>
+              <a:t>cohen</a:t>
+            </a:r>
+            <a:r>
+              <a:rPr lang="en-US" dirty="0" smtClean="0"/>
+              <a:t>?</a:t>
+            </a:r>
+            <a:endParaRPr lang="en-US" dirty="0" smtClean="0"/>
+          </a:p>
+        </p:txBody>
+      </p:sp>
+      <p:sp>
+        <p:nvSpPr>
+          <p:cNvPr id="4" name="Slide Number Placeholder 3"/>
+          <p:cNvSpPr>
+            <a:spLocks noGrp="1"/>
+          </p:cNvSpPr>
+          <p:nvPr>
+            <p:ph type="sldNum" sz="quarter" idx="10"/>
+          </p:nvPr>
+        </p:nvSpPr>
+        <p:spPr/>
+        <p:txBody>
+          <a:bodyPr/>
+          <a:lstStyle/>
+          <a:p>
+            <a:fld id="{01C44D18-1D51-9E44-B2EF-5697FEB7B333}" type="slidenum">
+              <a:rPr lang="en-US" smtClean="0"/>
+              <a:t>6</a:t>
             </a:fld>
             <a:endParaRPr lang="en-US"/>
           </a:p>
@@ -1039,7 +1173,7 @@
           <a:p>
             <a:fld id="{C8A432C8-69A7-458B-9684-2BFA64B31948}" type="datetime2">
               <a:rPr lang="en-US" smtClean="0"/>
-              <a:t>Monday, January 23, 17</a:t>
+              <a:t>Wednesday, January 25, 17</a:t>
             </a:fld>
             <a:endParaRPr lang="en-US"/>
           </a:p>
@@ -1241,7 +1375,7 @@
           <a:p>
             <a:fld id="{8CC057FC-95B6-4D89-AFDA-ABA33EE921E5}" type="datetime2">
               <a:rPr lang="en-US" smtClean="0"/>
-              <a:t>Monday, January 23, 17</a:t>
+              <a:t>Wednesday, January 25, 17</a:t>
             </a:fld>
             <a:endParaRPr lang="en-US"/>
           </a:p>
@@ -1418,7 +1552,7 @@
           <a:p>
             <a:fld id="{EC4549AC-EB31-477F-92A9-B1988E232878}" type="datetime2">
               <a:rPr lang="en-US" smtClean="0"/>
-              <a:t>Monday, January 23, 17</a:t>
+              <a:t>Wednesday, January 25, 17</a:t>
             </a:fld>
             <a:endParaRPr lang="en-US"/>
           </a:p>
@@ -1585,7 +1719,7 @@
           <a:p>
             <a:fld id="{6396A3A3-94A6-4E5B-AF39-173ACA3E61CC}" type="datetime2">
               <a:rPr lang="en-US" smtClean="0"/>
-              <a:t>Monday, January 23, 17</a:t>
+              <a:t>Wednesday, January 25, 17</a:t>
             </a:fld>
             <a:endParaRPr lang="en-US"/>
           </a:p>
@@ -1835,7 +1969,7 @@
           <a:p>
             <a:fld id="{9933D019-A32C-4EAD-B8E6-DBDA699692FD}" type="datetime2">
               <a:rPr lang="en-US" smtClean="0"/>
-              <a:t>Monday, January 23, 17</a:t>
+              <a:t>Wednesday, January 25, 17</a:t>
             </a:fld>
             <a:endParaRPr lang="en-US"/>
           </a:p>
@@ -2155,7 +2289,7 @@
           <a:p>
             <a:fld id="{CCEBA98F-560C-4997-81C4-81D4D9187EAB}" type="datetime2">
               <a:rPr lang="en-US" smtClean="0"/>
-              <a:t>Monday, January 23, 17</a:t>
+              <a:t>Wednesday, January 25, 17</a:t>
             </a:fld>
             <a:endParaRPr lang="en-US"/>
           </a:p>
@@ -2623,7 +2757,7 @@
           <a:p>
             <a:fld id="{150972B2-CA5C-437D-87D0-8081271A9E4B}" type="datetime2">
               <a:rPr lang="en-US" smtClean="0"/>
-              <a:t>Monday, January 23, 17</a:t>
+              <a:t>Wednesday, January 25, 17</a:t>
             </a:fld>
             <a:endParaRPr lang="en-US"/>
           </a:p>
@@ -2773,7 +2907,7 @@
           <a:p>
             <a:fld id="{79CD4847-11EF-4466-A8AD-85CDB7B49118}" type="datetime2">
               <a:rPr lang="en-US" smtClean="0"/>
-              <a:t>Monday, January 23, 17</a:t>
+              <a:t>Wednesday, January 25, 17</a:t>
             </a:fld>
             <a:endParaRPr lang="en-US"/>
           </a:p>
@@ -2865,7 +2999,7 @@
           <a:p>
             <a:fld id="{F168457A-3AB9-4880-8A0C-9F8524491207}" type="datetime2">
               <a:rPr lang="en-US" smtClean="0"/>
-              <a:t>Monday, January 23, 17</a:t>
+              <a:t>Wednesday, January 25, 17</a:t>
             </a:fld>
             <a:endParaRPr lang="en-US"/>
           </a:p>
@@ -3141,7 +3275,7 @@
           <a:p>
             <a:fld id="{3FE976D3-5B7F-4300-ABED-C91F1B2AE209}" type="datetime2">
               <a:rPr lang="en-US" smtClean="0"/>
-              <a:t>Monday, January 23, 17</a:t>
+              <a:t>Wednesday, January 25, 17</a:t>
             </a:fld>
             <a:endParaRPr lang="en-US"/>
           </a:p>
@@ -3448,7 +3582,7 @@
           <a:p>
             <a:fld id="{EBDC1E59-17DD-41CE-97CA-624A472382D4}" type="datetime2">
               <a:rPr lang="en-US" smtClean="0"/>
-              <a:t>Monday, January 23, 17</a:t>
+              <a:t>Wednesday, January 25, 17</a:t>
             </a:fld>
             <a:endParaRPr lang="en-US"/>
           </a:p>
@@ -3748,7 +3882,7 @@
           <a:p>
             <a:fld id="{A80CB818-7379-467D-8E76-EF9D9074A26C}" type="datetime2">
               <a:rPr lang="en-US" smtClean="0"/>
-              <a:t>Monday, January 23, 17</a:t>
+              <a:t>Wednesday, January 25, 17</a:t>
             </a:fld>
             <a:endParaRPr lang="en-US" dirty="0"/>
           </a:p>
@@ -4175,7 +4309,7 @@
                 <a:latin typeface="Arial"/>
                 <a:cs typeface="Arial"/>
               </a:rPr>
-              <a:t>Generation</a:t>
+              <a:t>Transcription</a:t>
             </a:r>
             <a:endParaRPr lang="en-US" cap="none" dirty="0">
               <a:latin typeface="Arial"/>
@@ -4423,8 +4557,21 @@
             </a:r>
             <a:r>
               <a:rPr lang="en-US" dirty="0" smtClean="0"/>
-              <a:t> 2007</a:t>
-            </a:r>
+              <a:t> </a:t>
+            </a:r>
+            <a:r>
+              <a:rPr lang="en-US" dirty="0" smtClean="0"/>
+              <a:t>2007, </a:t>
+            </a:r>
+            <a:r>
+              <a:rPr lang="en-US" dirty="0" err="1" smtClean="0"/>
+              <a:t>Galembo</a:t>
+            </a:r>
+            <a:r>
+              <a:rPr lang="en-US" dirty="0" smtClean="0"/>
+              <a:t> 1999</a:t>
+            </a:r>
+            <a:endParaRPr lang="en-US" dirty="0" smtClean="0"/>
           </a:p>
           <a:p>
             <a:pPr lvl="1"/>
@@ -4595,19 +4742,16 @@
             </a:r>
             <a:r>
               <a:rPr lang="en-US" dirty="0" smtClean="0"/>
-              <a:t>alid and high-quality tabs</a:t>
-            </a:r>
+              <a:t>alid and high-quality tabs, though not necessarily exact!</a:t>
+            </a:r>
+          </a:p>
+          <a:p>
+            <a:pPr lvl="1"/>
             <a:r>
               <a:rPr lang="en-US" dirty="0" smtClean="0"/>
-              <a:t>, though not necessarily exact!</a:t>
-            </a:r>
-          </a:p>
-          <a:p>
-            <a:pPr lvl="1"/>
-            <a:r>
-              <a:rPr lang="en-US" dirty="0" smtClean="0"/>
-              <a:t>Music score</a:t>
-            </a:r>
+              <a:t>From music score:</a:t>
+            </a:r>
+            <a:endParaRPr lang="en-US" dirty="0" smtClean="0"/>
           </a:p>
           <a:p>
             <a:pPr lvl="2"/>
@@ -4641,7 +4785,6 @@
               <a:rPr lang="en-US" dirty="0" smtClean="0"/>
               <a:t> 2004 – path difference  learning</a:t>
             </a:r>
-            <a:endParaRPr lang="en-US" dirty="0" smtClean="0"/>
           </a:p>
           <a:p>
             <a:pPr lvl="2"/>
@@ -4653,14 +4796,31 @@
               <a:rPr lang="en-US" dirty="0" smtClean="0"/>
               <a:t> – GA, NN </a:t>
             </a:r>
+          </a:p>
+          <a:p>
+            <a:pPr lvl="1"/>
+            <a:r>
+              <a:rPr lang="en-US" dirty="0" smtClean="0"/>
+              <a:t>From audio:</a:t>
+            </a:r>
+          </a:p>
+          <a:p>
+            <a:pPr lvl="2"/>
+            <a:r>
+              <a:rPr lang="en-US" dirty="0" err="1" smtClean="0"/>
+              <a:t>Burlet</a:t>
+            </a:r>
+            <a:r>
+              <a:rPr lang="en-US" dirty="0" smtClean="0"/>
+              <a:t> 2013 – polyphonic transcription </a:t>
+            </a:r>
+            <a:r>
+              <a:rPr lang="en-US" dirty="0" smtClean="0">
+                <a:sym typeface="Wingdings"/>
+              </a:rPr>
+              <a:t> optimal path in directed graph</a:t>
+            </a:r>
             <a:endParaRPr lang="en-US" dirty="0" smtClean="0"/>
-          </a:p>
-          <a:p>
-            <a:pPr lvl="1"/>
-            <a:r>
-              <a:rPr lang="en-US" dirty="0" smtClean="0"/>
-              <a:t>Audio</a:t>
-            </a:r>
           </a:p>
           <a:p>
             <a:pPr lvl="2"/>
@@ -4783,7 +4943,6 @@
               <a:rPr lang="en-US" dirty="0" smtClean="0"/>
               <a:t>O’Grady 2009</a:t>
             </a:r>
-            <a:endParaRPr lang="en-US" dirty="0" smtClean="0"/>
           </a:p>
           <a:p>
             <a:pPr lvl="1"/>
@@ -4810,7 +4969,6 @@
               <a:rPr lang="en-US" dirty="0" smtClean="0"/>
               <a:t> 2007, Burns 2006</a:t>
             </a:r>
-            <a:endParaRPr lang="en-US" dirty="0" smtClean="0"/>
           </a:p>
           <a:p>
             <a:pPr lvl="1"/>
@@ -4829,7 +4987,6 @@
               <a:rPr lang="en-US" dirty="0" smtClean="0"/>
               <a:t> 2012, 2012, 2009</a:t>
             </a:r>
-            <a:endParaRPr lang="en-US" dirty="0" smtClean="0"/>
           </a:p>
           <a:p>
             <a:pPr lvl="2"/>
@@ -4847,11 +5004,7 @@
             </a:r>
             <a:r>
               <a:rPr lang="en-US" dirty="0" smtClean="0"/>
-              <a:t> 2013,</a:t>
-            </a:r>
-            <a:r>
-              <a:rPr lang="en-US" dirty="0" smtClean="0"/>
-              <a:t> </a:t>
+              <a:t> 2013, </a:t>
             </a:r>
             <a:r>
               <a:rPr lang="en-US" dirty="0" err="1" smtClean="0"/>
@@ -4904,6 +5057,114 @@
     <p:extLst>
       <p:ext uri="{BB962C8B-B14F-4D97-AF65-F5344CB8AC3E}">
         <p14:creationId xmlns:p14="http://schemas.microsoft.com/office/powerpoint/2010/main" val="3711054321"/>
+      </p:ext>
+    </p:extLst>
+  </p:cSld>
+  <p:clrMapOvr>
+    <a:masterClrMapping/>
+  </p:clrMapOvr>
+  <p:timing>
+    <p:tnLst>
+      <p:par>
+        <p:cTn xmlns:p14="http://schemas.microsoft.com/office/powerpoint/2010/main" id="1" dur="indefinite" restart="never" nodeType="tmRoot"/>
+      </p:par>
+    </p:tnLst>
+  </p:timing>
+</p:sld>
+</file>
+
+<file path=ppt/slides/slide6.xml><?xml version="1.0" encoding="utf-8"?>
+<p:sld xmlns:a="http://schemas.openxmlformats.org/drawingml/2006/main" xmlns:r="http://schemas.openxmlformats.org/officeDocument/2006/relationships" xmlns:p="http://schemas.openxmlformats.org/presentationml/2006/main">
+  <p:cSld>
+    <p:spTree>
+      <p:nvGrpSpPr>
+        <p:cNvPr id="1" name=""/>
+        <p:cNvGrpSpPr/>
+        <p:nvPr/>
+      </p:nvGrpSpPr>
+      <p:grpSpPr>
+        <a:xfrm>
+          <a:off x="0" y="0"/>
+          <a:ext cx="0" cy="0"/>
+          <a:chOff x="0" y="0"/>
+          <a:chExt cx="0" cy="0"/>
+        </a:xfrm>
+      </p:grpSpPr>
+      <p:sp>
+        <p:nvSpPr>
+          <p:cNvPr id="3" name="Content Placeholder 2"/>
+          <p:cNvSpPr>
+            <a:spLocks noGrp="1"/>
+          </p:cNvSpPr>
+          <p:nvPr>
+            <p:ph idx="1"/>
+          </p:nvPr>
+        </p:nvSpPr>
+        <p:spPr/>
+        <p:txBody>
+          <a:bodyPr/>
+          <a:lstStyle/>
+          <a:p>
+            <a:pPr lvl="1"/>
+            <a:r>
+              <a:rPr lang="en-US" dirty="0" err="1" smtClean="0"/>
+              <a:t>Tabify</a:t>
+            </a:r>
+            <a:endParaRPr lang="en-US" dirty="0" smtClean="0"/>
+          </a:p>
+          <a:p>
+            <a:pPr lvl="1"/>
+            <a:r>
+              <a:rPr lang="en-US" dirty="0" err="1" smtClean="0"/>
+              <a:t>Yousician</a:t>
+            </a:r>
+            <a:endParaRPr lang="en-US" dirty="0" smtClean="0"/>
+          </a:p>
+          <a:p>
+            <a:pPr lvl="1"/>
+            <a:r>
+              <a:rPr lang="en-US" dirty="0" smtClean="0"/>
+              <a:t>Guitar Pro</a:t>
+            </a:r>
+          </a:p>
+          <a:p>
+            <a:pPr lvl="1"/>
+            <a:r>
+              <a:rPr lang="en-US" dirty="0" smtClean="0"/>
+              <a:t>Adobe Audition??</a:t>
+            </a:r>
+          </a:p>
+        </p:txBody>
+      </p:sp>
+      <p:sp>
+        <p:nvSpPr>
+          <p:cNvPr id="4" name="Title 3"/>
+          <p:cNvSpPr>
+            <a:spLocks noGrp="1"/>
+          </p:cNvSpPr>
+          <p:nvPr>
+            <p:ph type="title"/>
+          </p:nvPr>
+        </p:nvSpPr>
+        <p:spPr/>
+        <p:txBody>
+          <a:bodyPr>
+            <a:normAutofit/>
+          </a:bodyPr>
+          <a:lstStyle/>
+          <a:p>
+            <a:r>
+              <a:rPr lang="en-US" dirty="0" smtClean="0"/>
+              <a:t>Existing work: commercial apps</a:t>
+            </a:r>
+            <a:endParaRPr lang="en-US" i="1" dirty="0"/>
+          </a:p>
+        </p:txBody>
+      </p:sp>
+    </p:spTree>
+    <p:extLst>
+      <p:ext uri="{BB962C8B-B14F-4D97-AF65-F5344CB8AC3E}">
+        <p14:creationId xmlns:p14="http://schemas.microsoft.com/office/powerpoint/2010/main" val="2325073001"/>
       </p:ext>
     </p:extLst>
   </p:cSld>

</xml_diff>